<commit_message>
docs: updating links again
</commit_message>
<xml_diff>
--- a/output/E-BOOK_Cowboys_Dados.pptx
+++ b/output/E-BOOK_Cowboys_Dados.pptx
@@ -6353,7 +6353,7 @@
         <p:spPr>
           <a:xfrm>
             <a:off x="0" y="10390502"/>
-            <a:ext cx="9601200" cy="461665"/>
+            <a:ext cx="9601200" cy="369332"/>
           </a:xfrm>
           <a:prstGeom prst="rect">
             <a:avLst/>
@@ -6368,7 +6368,7 @@
           <a:p>
             <a:pPr algn="ctr"/>
             <a:r>
-              <a:rPr lang="pt-BR" sz="2400" u="sng" dirty="0">
+              <a:rPr lang="pt-BR" u="sng" dirty="0">
                 <a:solidFill>
                   <a:schemeClr val="tx2">
                     <a:lumMod val="75000"/>
@@ -6379,7 +6379,7 @@
                 <a:ea typeface="Calibri" panose="020F0502020204030204" pitchFamily="34" charset="0"/>
                 <a:cs typeface="Calibri" panose="020F0502020204030204" pitchFamily="34" charset="0"/>
               </a:rPr>
-              <a:t>Perfil da DIO</a:t>
+              <a:t>https://www.dio.me/users/lucasantonioribeiro0</a:t>
             </a:r>
           </a:p>
         </p:txBody>
@@ -6400,7 +6400,7 @@
         <p:spPr>
           <a:xfrm>
             <a:off x="-2" y="7720105"/>
-            <a:ext cx="9601200" cy="461665"/>
+            <a:ext cx="9601200" cy="369332"/>
           </a:xfrm>
           <a:prstGeom prst="rect">
             <a:avLst/>
@@ -6415,7 +6415,7 @@
           <a:p>
             <a:pPr algn="ctr"/>
             <a:r>
-              <a:rPr lang="pt-BR" sz="2400" u="sng" dirty="0">
+              <a:rPr lang="pt-BR" u="sng" dirty="0">
                 <a:solidFill>
                   <a:schemeClr val="tx2">
                     <a:lumMod val="75000"/>
@@ -6426,7 +6426,7 @@
                 <a:ea typeface="Calibri" panose="020F0502020204030204" pitchFamily="34" charset="0"/>
                 <a:cs typeface="Calibri" panose="020F0502020204030204" pitchFamily="34" charset="0"/>
               </a:rPr>
-              <a:t>Repositório GitHub</a:t>
+              <a:t>https://github.com/Lucas-Ribeir0/creating-a-ebook-with-ia-dio-me/</a:t>
             </a:r>
           </a:p>
         </p:txBody>

</xml_diff>